<commit_message>
changed: presentazione senza immagini caricata
</commit_message>
<xml_diff>
--- a/esercitazione_4/documents/Esercitazione 4.pptx
+++ b/esercitazione_4/documents/Esercitazione 4.pptx
@@ -165,6 +165,7 @@
   <p1510:revLst>
     <p1510:client id="{15BB80DA-39E0-EB22-234F-00C6CDC5EB2E}" v="25" dt="2021-11-02T08:31:21.331"/>
     <p1510:client id="{93E8013D-5D9F-D8D0-3077-AD1DAEF36394}" v="56" dt="2021-11-02T00:15:21.420"/>
+    <p1510:client id="{BE35D40C-9454-6525-F945-173D5024E78C}" v="531" dt="2021-11-07T23:35:50.989"/>
   </p1510:revLst>
 </p1510:revInfo>
 </file>
@@ -392,7 +393,7 @@
             <a:fld id="{B6F15528-21DE-4FAA-801E-634DDDAF4B2B}" type="slidenum">
               <a:rPr lang="en-US" smtClean="0"/>
               <a:pPr/>
-              <a:t>‹N›</a:t>
+              <a:t>‹#›</a:t>
             </a:fld>
             <a:endParaRPr lang="en-US" dirty="0"/>
           </a:p>
@@ -557,7 +558,7 @@
             <a:fld id="{B6F15528-21DE-4FAA-801E-634DDDAF4B2B}" type="slidenum">
               <a:rPr lang="en-US" smtClean="0"/>
               <a:pPr/>
-              <a:t>‹N›</a:t>
+              <a:t>‹#›</a:t>
             </a:fld>
             <a:endParaRPr lang="en-US" dirty="0"/>
           </a:p>
@@ -732,7 +733,7 @@
             <a:fld id="{B6F15528-21DE-4FAA-801E-634DDDAF4B2B}" type="slidenum">
               <a:rPr lang="en-US" smtClean="0"/>
               <a:pPr/>
-              <a:t>‹N›</a:t>
+              <a:t>‹#›</a:t>
             </a:fld>
             <a:endParaRPr lang="en-US" dirty="0"/>
           </a:p>
@@ -897,7 +898,7 @@
             <a:fld id="{B6F15528-21DE-4FAA-801E-634DDDAF4B2B}" type="slidenum">
               <a:rPr lang="en-US" smtClean="0"/>
               <a:pPr/>
-              <a:t>‹N›</a:t>
+              <a:t>‹#›</a:t>
             </a:fld>
             <a:endParaRPr lang="en-US" dirty="0"/>
           </a:p>
@@ -1139,7 +1140,7 @@
             <a:fld id="{B6F15528-21DE-4FAA-801E-634DDDAF4B2B}" type="slidenum">
               <a:rPr lang="en-US" smtClean="0"/>
               <a:pPr/>
-              <a:t>‹N›</a:t>
+              <a:t>‹#›</a:t>
             </a:fld>
             <a:endParaRPr lang="en-US" dirty="0"/>
           </a:p>
@@ -1421,7 +1422,7 @@
             <a:fld id="{B6F15528-21DE-4FAA-801E-634DDDAF4B2B}" type="slidenum">
               <a:rPr lang="en-US" smtClean="0"/>
               <a:pPr/>
-              <a:t>‹N›</a:t>
+              <a:t>‹#›</a:t>
             </a:fld>
             <a:endParaRPr lang="en-US" dirty="0"/>
           </a:p>
@@ -1837,7 +1838,7 @@
             <a:fld id="{B6F15528-21DE-4FAA-801E-634DDDAF4B2B}" type="slidenum">
               <a:rPr lang="en-US" smtClean="0"/>
               <a:pPr/>
-              <a:t>‹N›</a:t>
+              <a:t>‹#›</a:t>
             </a:fld>
             <a:endParaRPr lang="en-US" dirty="0"/>
           </a:p>
@@ -1951,7 +1952,7 @@
             <a:fld id="{B6F15528-21DE-4FAA-801E-634DDDAF4B2B}" type="slidenum">
               <a:rPr lang="en-US" smtClean="0"/>
               <a:pPr/>
-              <a:t>‹N›</a:t>
+              <a:t>‹#›</a:t>
             </a:fld>
             <a:endParaRPr lang="en-US" dirty="0"/>
           </a:p>
@@ -2043,7 +2044,7 @@
             <a:fld id="{B6F15528-21DE-4FAA-801E-634DDDAF4B2B}" type="slidenum">
               <a:rPr lang="en-US" smtClean="0"/>
               <a:pPr/>
-              <a:t>‹N›</a:t>
+              <a:t>‹#›</a:t>
             </a:fld>
             <a:endParaRPr lang="en-US" dirty="0"/>
           </a:p>
@@ -2315,7 +2316,7 @@
             <a:fld id="{B6F15528-21DE-4FAA-801E-634DDDAF4B2B}" type="slidenum">
               <a:rPr lang="en-US" smtClean="0"/>
               <a:pPr/>
-              <a:t>‹N›</a:t>
+              <a:t>‹#›</a:t>
             </a:fld>
             <a:endParaRPr lang="en-US" dirty="0"/>
           </a:p>
@@ -2564,7 +2565,7 @@
             <a:fld id="{B6F15528-21DE-4FAA-801E-634DDDAF4B2B}" type="slidenum">
               <a:rPr lang="en-US" smtClean="0"/>
               <a:pPr/>
-              <a:t>‹N›</a:t>
+              <a:t>‹#›</a:t>
             </a:fld>
             <a:endParaRPr lang="en-US" dirty="0"/>
           </a:p>
@@ -2808,7 +2809,7 @@
             <a:fld id="{B6F15528-21DE-4FAA-801E-634DDDAF4B2B}" type="slidenum">
               <a:rPr lang="en-US" smtClean="0"/>
               <a:pPr/>
-              <a:t>‹N›</a:t>
+              <a:t>‹#›</a:t>
             </a:fld>
             <a:endParaRPr lang="en-US" dirty="0"/>
           </a:p>
@@ -3233,20 +3234,14 @@
               <a:t>Esercitazione</a:t>
             </a:r>
             <a:r>
-              <a:rPr lang="en-US" sz="9000">
+              <a:rPr lang="en-US" sz="9000" dirty="0">
                 <a:solidFill>
                   <a:srgbClr val="000000"/>
                 </a:solidFill>
                 <a:latin typeface="Open Sans Extra Bold"/>
               </a:rPr>
-              <a:t> 3</a:t>
-            </a:r>
-            <a:endParaRPr lang="en-US" sz="9000" dirty="0">
-              <a:solidFill>
-                <a:srgbClr val="000000"/>
-              </a:solidFill>
-              <a:latin typeface="Open Sans Extra Bold"/>
-            </a:endParaRPr>
+              <a:t> 4</a:t>
+            </a:r>
           </a:p>
           <a:p>
             <a:pPr algn="ctr">
@@ -3313,7 +3308,7 @@
                 </a:solidFill>
                 <a:latin typeface="Open Sans"/>
               </a:rPr>
-              <a:t>Socket in C </a:t>
+              <a:t>Socket C con Select</a:t>
             </a:r>
             <a:endParaRPr lang="en-US" sz="5150" dirty="0">
               <a:latin typeface="Open Sans"/>
@@ -4078,7 +4073,7 @@
         <p:spPr>
           <a:xfrm>
             <a:off x="1811754" y="3347575"/>
-            <a:ext cx="4640014" cy="966290"/>
+            <a:ext cx="4640014" cy="466153"/>
           </a:xfrm>
           <a:prstGeom prst="rect">
             <a:avLst/>
@@ -4104,7 +4099,23 @@
                 <a:ea typeface="Open Sans Light"/>
                 <a:cs typeface="Open Sans Light"/>
               </a:rPr>
-              <a:t>Creazione e gestione socket datagram in C</a:t>
+              <a:t>Gestione </a:t>
+            </a:r>
+            <a:r>
+              <a:rPr lang="it-IT" sz="2750" dirty="0" err="1">
+                <a:latin typeface="Open Sans Light"/>
+                <a:ea typeface="Open Sans Light"/>
+                <a:cs typeface="Open Sans Light"/>
+              </a:rPr>
+              <a:t>socket</a:t>
+            </a:r>
+            <a:r>
+              <a:rPr lang="it-IT" sz="2750" dirty="0">
+                <a:latin typeface="Open Sans Light"/>
+                <a:ea typeface="Open Sans Light"/>
+                <a:cs typeface="Open Sans Light"/>
+              </a:rPr>
+              <a:t> con Select</a:t>
             </a:r>
           </a:p>
         </p:txBody>
@@ -4396,198 +4407,6 @@
       </p:sp>
       <p:grpSp>
         <p:nvGrpSpPr>
-          <p:cNvPr id="31" name="Group 12">
-            <a:extLst>
-              <a:ext uri="{FF2B5EF4-FFF2-40B4-BE49-F238E27FC236}">
-                <a16:creationId xmlns:a16="http://schemas.microsoft.com/office/drawing/2014/main" id="{8FCC6868-4667-4EB3-A296-6886BA6018A1}"/>
-              </a:ext>
-            </a:extLst>
-          </p:cNvPr>
-          <p:cNvGrpSpPr/>
-          <p:nvPr/>
-        </p:nvGrpSpPr>
-        <p:grpSpPr>
-          <a:xfrm>
-            <a:off x="336271" y="4580933"/>
-            <a:ext cx="1289957" cy="1289957"/>
-            <a:chOff x="0" y="0"/>
-            <a:chExt cx="1719943" cy="1719943"/>
-          </a:xfrm>
-        </p:grpSpPr>
-        <p:grpSp>
-          <p:nvGrpSpPr>
-            <p:cNvPr id="32" name="Group 13">
-              <a:extLst>
-                <a:ext uri="{FF2B5EF4-FFF2-40B4-BE49-F238E27FC236}">
-                  <a16:creationId xmlns:a16="http://schemas.microsoft.com/office/drawing/2014/main" id="{7406A769-B011-4DBB-81A5-1083BA87FEBF}"/>
-                </a:ext>
-              </a:extLst>
-            </p:cNvPr>
-            <p:cNvGrpSpPr/>
-            <p:nvPr/>
-          </p:nvGrpSpPr>
-          <p:grpSpPr>
-            <a:xfrm>
-              <a:off x="0" y="0"/>
-              <a:ext cx="1719943" cy="1719943"/>
-              <a:chOff x="0" y="0"/>
-              <a:chExt cx="6350000" cy="6350000"/>
-            </a:xfrm>
-          </p:grpSpPr>
-          <p:sp>
-            <p:nvSpPr>
-              <p:cNvPr id="34" name="Freeform 14">
-                <a:extLst>
-                  <a:ext uri="{FF2B5EF4-FFF2-40B4-BE49-F238E27FC236}">
-                    <a16:creationId xmlns:a16="http://schemas.microsoft.com/office/drawing/2014/main" id="{AB951A4B-EE80-4F06-94D6-2943A7D45F65}"/>
-                  </a:ext>
-                </a:extLst>
-              </p:cNvPr>
-              <p:cNvSpPr/>
-              <p:nvPr/>
-            </p:nvSpPr>
-            <p:spPr>
-              <a:xfrm>
-                <a:off x="14167" y="0"/>
-                <a:ext cx="6321665" cy="6350000"/>
-              </a:xfrm>
-              <a:custGeom>
-                <a:avLst/>
-                <a:gdLst/>
-                <a:ahLst/>
-                <a:cxnLst/>
-                <a:rect l="l" t="t" r="r" b="b"/>
-                <a:pathLst>
-                  <a:path w="6321665" h="6350000">
-                    <a:moveTo>
-                      <a:pt x="3160833" y="0"/>
-                    </a:moveTo>
-                    <a:lnTo>
-                      <a:pt x="3160833" y="0"/>
-                    </a:lnTo>
-                    <a:cubicBezTo>
-                      <a:pt x="4908795" y="7817"/>
-                      <a:pt x="6321666" y="1427021"/>
-                      <a:pt x="6321666" y="3175000"/>
-                    </a:cubicBezTo>
-                    <a:cubicBezTo>
-                      <a:pt x="6321666" y="4922979"/>
-                      <a:pt x="4908795" y="6342183"/>
-                      <a:pt x="3160833" y="6350000"/>
-                    </a:cubicBezTo>
-                    <a:cubicBezTo>
-                      <a:pt x="1412871" y="6342183"/>
-                      <a:pt x="0" y="4922979"/>
-                      <a:pt x="0" y="3175000"/>
-                    </a:cubicBezTo>
-                    <a:cubicBezTo>
-                      <a:pt x="0" y="1427021"/>
-                      <a:pt x="1412871" y="7817"/>
-                      <a:pt x="3160833" y="0"/>
-                    </a:cubicBezTo>
-                    <a:close/>
-                  </a:path>
-                </a:pathLst>
-              </a:custGeom>
-              <a:solidFill>
-                <a:srgbClr val="004AAD"/>
-              </a:solidFill>
-            </p:spPr>
-          </p:sp>
-        </p:grpSp>
-        <p:sp>
-          <p:nvSpPr>
-            <p:cNvPr id="33" name="TextBox 15">
-              <a:extLst>
-                <a:ext uri="{FF2B5EF4-FFF2-40B4-BE49-F238E27FC236}">
-                  <a16:creationId xmlns:a16="http://schemas.microsoft.com/office/drawing/2014/main" id="{95F03568-38EE-4120-8D0D-5EC3311CA80E}"/>
-                </a:ext>
-              </a:extLst>
-            </p:cNvPr>
-            <p:cNvSpPr txBox="1"/>
-            <p:nvPr/>
-          </p:nvSpPr>
-          <p:spPr>
-            <a:xfrm>
-              <a:off x="696856" y="450820"/>
-              <a:ext cx="326231" cy="765595"/>
-            </a:xfrm>
-            <a:prstGeom prst="rect">
-              <a:avLst/>
-            </a:prstGeom>
-          </p:spPr>
-          <p:txBody>
-            <a:bodyPr lIns="0" tIns="0" rIns="0" bIns="0" rtlCol="0" anchor="t">
-              <a:spAutoFit/>
-            </a:bodyPr>
-            <a:lstStyle/>
-            <a:p>
-              <a:pPr algn="ctr">
-                <a:lnSpc>
-                  <a:spcPts val="4759"/>
-                </a:lnSpc>
-              </a:pPr>
-              <a:r>
-                <a:rPr lang="en-US" sz="3399" dirty="0">
-                  <a:solidFill>
-                    <a:srgbClr val="FFFFFF"/>
-                  </a:solidFill>
-                  <a:latin typeface="Open Sans Light Bold"/>
-                </a:rPr>
-                <a:t>2</a:t>
-              </a:r>
-            </a:p>
-          </p:txBody>
-        </p:sp>
-      </p:grpSp>
-      <p:sp>
-        <p:nvSpPr>
-          <p:cNvPr id="35" name="TextBox 16">
-            <a:extLst>
-              <a:ext uri="{FF2B5EF4-FFF2-40B4-BE49-F238E27FC236}">
-                <a16:creationId xmlns:a16="http://schemas.microsoft.com/office/drawing/2014/main" id="{69128DBF-D603-4EF5-A04E-6D86E4F281C1}"/>
-              </a:ext>
-            </a:extLst>
-          </p:cNvPr>
-          <p:cNvSpPr txBox="1"/>
-          <p:nvPr/>
-        </p:nvSpPr>
-        <p:spPr>
-          <a:xfrm>
-            <a:off x="1814632" y="4746115"/>
-            <a:ext cx="4640014" cy="966290"/>
-          </a:xfrm>
-          <a:prstGeom prst="rect">
-            <a:avLst/>
-          </a:prstGeom>
-        </p:spPr>
-        <p:txBody>
-          <a:bodyPr wrap="square" lIns="0" tIns="0" rIns="0" bIns="0" rtlCol="0" anchor="t">
-            <a:spAutoFit/>
-          </a:bodyPr>
-          <a:lstStyle/>
-          <a:p>
-            <a:pPr algn="ctr">
-              <a:lnSpc>
-                <a:spcPts val="3863"/>
-              </a:lnSpc>
-              <a:spcBef>
-                <a:spcPct val="0"/>
-              </a:spcBef>
-            </a:pPr>
-            <a:r>
-              <a:rPr lang="it-IT" sz="2750" dirty="0">
-                <a:latin typeface="Open Sans Light"/>
-                <a:ea typeface="Open Sans Light"/>
-                <a:cs typeface="Open Sans Light"/>
-              </a:rPr>
-              <a:t>Gestione di file con client filtro</a:t>
-            </a:r>
-          </a:p>
-        </p:txBody>
-      </p:sp>
-      <p:grpSp>
-        <p:nvGrpSpPr>
           <p:cNvPr id="36" name="Group 12">
             <a:extLst>
               <a:ext uri="{FF2B5EF4-FFF2-40B4-BE49-F238E27FC236}">
@@ -4600,7 +4419,7 @@
         </p:nvGrpSpPr>
         <p:grpSpPr>
           <a:xfrm>
-            <a:off x="326767" y="6975284"/>
+            <a:off x="312828" y="5344418"/>
             <a:ext cx="1289957" cy="1289957"/>
             <a:chOff x="0" y="0"/>
             <a:chExt cx="1719943" cy="1719943"/>
@@ -4702,7 +4521,7 @@
           <p:spPr>
             <a:xfrm>
               <a:off x="696856" y="450820"/>
-              <a:ext cx="326231" cy="751628"/>
+              <a:ext cx="326231" cy="763457"/>
             </a:xfrm>
             <a:prstGeom prst="rect">
               <a:avLst/>
@@ -4720,13 +4539,15 @@
                 </a:lnSpc>
               </a:pPr>
               <a:r>
-                <a:rPr lang="en-US" sz="3399" dirty="0">
+                <a:rPr lang="en-US" sz="3350" dirty="0">
                   <a:solidFill>
                     <a:srgbClr val="FFFFFF"/>
                   </a:solidFill>
                   <a:latin typeface="Open Sans Light Bold"/>
+                  <a:ea typeface="Open Sans Light Bold"/>
+                  <a:cs typeface="Open Sans Light Bold"/>
                 </a:rPr>
-                <a:t>1</a:t>
+                <a:t>2</a:t>
               </a:r>
             </a:p>
           </p:txBody>
@@ -4746,8 +4567,8 @@
         </p:nvSpPr>
         <p:spPr>
           <a:xfrm>
-            <a:off x="1805128" y="7140466"/>
-            <a:ext cx="4640014" cy="966290"/>
+            <a:off x="1791189" y="5509600"/>
+            <a:ext cx="4640014" cy="466153"/>
           </a:xfrm>
           <a:prstGeom prst="rect">
             <a:avLst/>
@@ -4773,7 +4594,7 @@
                 <a:ea typeface="Open Sans Light"/>
                 <a:cs typeface="Open Sans Light"/>
               </a:rPr>
-              <a:t>Creazione e gestione socket con connessione in C</a:t>
+              <a:t>Gestione direttori</a:t>
             </a:r>
           </a:p>
         </p:txBody>
@@ -4792,10 +4613,10 @@
         </p:nvGrpSpPr>
         <p:grpSpPr>
           <a:xfrm>
-            <a:off x="329645" y="8373824"/>
-            <a:ext cx="1289957" cy="1289957"/>
+            <a:off x="329645" y="7565360"/>
+            <a:ext cx="1289957" cy="1526261"/>
             <a:chOff x="0" y="0"/>
-            <a:chExt cx="1719943" cy="1719943"/>
+            <a:chExt cx="1719943" cy="2035015"/>
           </a:xfrm>
         </p:grpSpPr>
         <p:grpSp>
@@ -4894,7 +4715,7 @@
           <p:spPr>
             <a:xfrm>
               <a:off x="696856" y="450820"/>
-              <a:ext cx="326231" cy="765595"/>
+              <a:ext cx="326231" cy="1584195"/>
             </a:xfrm>
             <a:prstGeom prst="rect">
               <a:avLst/>
@@ -4912,14 +4733,31 @@
                 </a:lnSpc>
               </a:pPr>
               <a:r>
-                <a:rPr lang="en-US" sz="3399" dirty="0">
+                <a:rPr lang="en-US" sz="3350" dirty="0">
                   <a:solidFill>
                     <a:srgbClr val="FFFFFF"/>
                   </a:solidFill>
                   <a:latin typeface="Open Sans Light Bold"/>
+                  <a:ea typeface="Open Sans Light Bold"/>
+                  <a:cs typeface="Open Sans Light Bold"/>
                 </a:rPr>
-                <a:t>2</a:t>
+                <a:t>3</a:t>
               </a:r>
+            </a:p>
+            <a:p>
+              <a:pPr algn="ctr">
+                <a:lnSpc>
+                  <a:spcPts val="4759"/>
+                </a:lnSpc>
+              </a:pPr>
+              <a:endParaRPr lang="en-US" sz="3350" dirty="0">
+                <a:solidFill>
+                  <a:srgbClr val="FFFFFF"/>
+                </a:solidFill>
+                <a:latin typeface="Open Sans Light Bold"/>
+                <a:ea typeface="Open Sans Light Bold"/>
+                <a:cs typeface="Open Sans Light Bold"/>
+              </a:endParaRPr>
             </a:p>
           </p:txBody>
         </p:sp>
@@ -4938,7 +4776,7 @@
         </p:nvSpPr>
         <p:spPr>
           <a:xfrm>
-            <a:off x="1808006" y="8539006"/>
+            <a:off x="1808006" y="7660847"/>
             <a:ext cx="4640014" cy="1466427"/>
           </a:xfrm>
           <a:prstGeom prst="rect">
@@ -4965,7 +4803,23 @@
                 <a:ea typeface="Open Sans Light"/>
                 <a:cs typeface="Open Sans Light"/>
               </a:rPr>
-              <a:t>Gestione di eliminazione di righe da un file tramite server parallelo</a:t>
+              <a:t>Gestione di eliminazione di </a:t>
+            </a:r>
+            <a:r>
+              <a:rPr lang="it-IT" sz="2750" dirty="0" err="1">
+                <a:latin typeface="Open Sans Light"/>
+                <a:ea typeface="Open Sans Light"/>
+                <a:cs typeface="Open Sans Light"/>
+              </a:rPr>
+              <a:t>occorenze</a:t>
+            </a:r>
+            <a:r>
+              <a:rPr lang="it-IT" sz="2750" dirty="0">
+                <a:latin typeface="Open Sans Light"/>
+                <a:ea typeface="Open Sans Light"/>
+                <a:cs typeface="Open Sans Light"/>
+              </a:rPr>
+              <a:t> di una parola richiesta</a:t>
             </a:r>
           </a:p>
         </p:txBody>
@@ -5460,7 +5314,7 @@
         </p:nvSpPr>
         <p:spPr>
           <a:xfrm>
-            <a:off x="1915132" y="3810980"/>
+            <a:off x="2221791" y="3838858"/>
             <a:ext cx="4583951" cy="966290"/>
           </a:xfrm>
           <a:prstGeom prst="rect">
@@ -5677,7 +5531,7 @@
         </p:nvSpPr>
         <p:spPr>
           <a:xfrm>
-            <a:off x="1915132" y="5739364"/>
+            <a:off x="2542388" y="5739364"/>
             <a:ext cx="3948559" cy="966290"/>
           </a:xfrm>
           <a:prstGeom prst="rect">
@@ -5718,7 +5572,7 @@
                 <a:ea typeface="Open Sans Light"/>
                 <a:cs typeface="Open Sans Light"/>
               </a:rPr>
-              <a:t> il </a:t>
+              <a:t> al server la </a:t>
             </a:r>
             <a:r>
               <a:rPr lang="en-US" sz="2750" dirty="0" err="1">
@@ -5729,7 +5583,7 @@
                 <a:ea typeface="Open Sans Light"/>
                 <a:cs typeface="Open Sans Light"/>
               </a:rPr>
-              <a:t>nome</a:t>
+              <a:t>richiesta</a:t>
             </a:r>
             <a:r>
               <a:rPr lang="en-US" sz="2750" dirty="0">
@@ -5740,7 +5594,18 @@
                 <a:ea typeface="Open Sans Light"/>
                 <a:cs typeface="Open Sans Light"/>
               </a:rPr>
-              <a:t> del file al server</a:t>
+              <a:t> di </a:t>
+            </a:r>
+            <a:r>
+              <a:rPr lang="en-US" sz="2750" dirty="0" err="1">
+                <a:solidFill>
+                  <a:srgbClr val="000000"/>
+                </a:solidFill>
+                <a:latin typeface="Open Sans Light"/>
+                <a:ea typeface="Open Sans Light"/>
+                <a:cs typeface="Open Sans Light"/>
+              </a:rPr>
+              <a:t>eliminazione</a:t>
             </a:r>
           </a:p>
         </p:txBody>
@@ -5875,7 +5740,7 @@
         </p:nvSpPr>
         <p:spPr>
           <a:xfrm>
-            <a:off x="1915132" y="7691723"/>
+            <a:off x="1915132" y="7594150"/>
             <a:ext cx="5189366" cy="1466427"/>
           </a:xfrm>
           <a:prstGeom prst="rect">
@@ -5993,7 +5858,7 @@
                 <a:ea typeface="Open Sans Light"/>
                 <a:cs typeface="Open Sans Light"/>
               </a:rPr>
-              <a:t>caratteri</a:t>
+              <a:t>occorenze</a:t>
             </a:r>
             <a:r>
               <a:rPr lang="en-US" sz="2750" dirty="0">
@@ -6004,117 +5869,7 @@
                 <a:ea typeface="Open Sans Light"/>
                 <a:cs typeface="Open Sans Light"/>
               </a:rPr>
-              <a:t> </a:t>
-            </a:r>
-            <a:r>
-              <a:rPr lang="en-US" sz="2750" dirty="0" err="1">
-                <a:solidFill>
-                  <a:srgbClr val="000000"/>
-                </a:solidFill>
-                <a:latin typeface="Open Sans Light"/>
-                <a:ea typeface="Open Sans Light"/>
-                <a:cs typeface="Open Sans Light"/>
-              </a:rPr>
-              <a:t>della</a:t>
-            </a:r>
-            <a:r>
-              <a:rPr lang="en-US" sz="2750" dirty="0">
-                <a:solidFill>
-                  <a:srgbClr val="000000"/>
-                </a:solidFill>
-                <a:latin typeface="Open Sans Light"/>
-                <a:ea typeface="Open Sans Light"/>
-                <a:cs typeface="Open Sans Light"/>
-              </a:rPr>
-              <a:t> </a:t>
-            </a:r>
-            <a:r>
-              <a:rPr lang="en-US" sz="2750" dirty="0" err="1">
-                <a:solidFill>
-                  <a:srgbClr val="000000"/>
-                </a:solidFill>
-                <a:latin typeface="Open Sans Light"/>
-                <a:ea typeface="Open Sans Light"/>
-                <a:cs typeface="Open Sans Light"/>
-              </a:rPr>
-              <a:t>parola</a:t>
-            </a:r>
-            <a:r>
-              <a:rPr lang="en-US" sz="2750" dirty="0">
-                <a:solidFill>
-                  <a:srgbClr val="000000"/>
-                </a:solidFill>
-                <a:latin typeface="Open Sans Light"/>
-                <a:ea typeface="Open Sans Light"/>
-                <a:cs typeface="Open Sans Light"/>
-              </a:rPr>
-              <a:t> </a:t>
-            </a:r>
-            <a:r>
-              <a:rPr lang="en-US" sz="2750" dirty="0" err="1">
-                <a:solidFill>
-                  <a:srgbClr val="000000"/>
-                </a:solidFill>
-                <a:latin typeface="Open Sans Light"/>
-                <a:ea typeface="Open Sans Light"/>
-                <a:cs typeface="Open Sans Light"/>
-              </a:rPr>
-              <a:t>più</a:t>
-            </a:r>
-            <a:r>
-              <a:rPr lang="en-US" sz="2750" dirty="0">
-                <a:solidFill>
-                  <a:srgbClr val="000000"/>
-                </a:solidFill>
-                <a:latin typeface="Open Sans Light"/>
-                <a:ea typeface="Open Sans Light"/>
-                <a:cs typeface="Open Sans Light"/>
-              </a:rPr>
-              <a:t> </a:t>
-            </a:r>
-            <a:r>
-              <a:rPr lang="en-US" sz="2750" dirty="0" err="1">
-                <a:solidFill>
-                  <a:srgbClr val="000000"/>
-                </a:solidFill>
-                <a:latin typeface="Open Sans Light"/>
-                <a:ea typeface="Open Sans Light"/>
-                <a:cs typeface="Open Sans Light"/>
-              </a:rPr>
-              <a:t>lunga</a:t>
-            </a:r>
-            <a:r>
-              <a:rPr lang="en-US" sz="2750" dirty="0">
-                <a:solidFill>
-                  <a:srgbClr val="000000"/>
-                </a:solidFill>
-                <a:latin typeface="Open Sans Light"/>
-                <a:ea typeface="Open Sans Light"/>
-                <a:cs typeface="Open Sans Light"/>
-              </a:rPr>
-              <a:t> </a:t>
-            </a:r>
-            <a:r>
-              <a:rPr lang="en-US" sz="2750" dirty="0" err="1">
-                <a:solidFill>
-                  <a:srgbClr val="000000"/>
-                </a:solidFill>
-                <a:latin typeface="Open Sans Light"/>
-                <a:ea typeface="Open Sans Light"/>
-                <a:cs typeface="Open Sans Light"/>
-              </a:rPr>
-              <a:t>nel</a:t>
-            </a:r>
-            <a:r>
-              <a:rPr lang="en-US" sz="2750" dirty="0">
-                <a:solidFill>
-                  <a:srgbClr val="000000"/>
-                </a:solidFill>
-                <a:latin typeface="Open Sans Light"/>
-                <a:ea typeface="Open Sans Light"/>
-                <a:cs typeface="Open Sans Light"/>
-              </a:rPr>
-              <a:t> file</a:t>
+              <a:t> cancellate</a:t>
             </a:r>
           </a:p>
         </p:txBody>
@@ -6249,7 +6004,7 @@
         </p:nvSpPr>
         <p:spPr>
           <a:xfrm>
-            <a:off x="10715867" y="3637432"/>
+            <a:off x="11022526" y="3623493"/>
             <a:ext cx="4432399" cy="966290"/>
           </a:xfrm>
           <a:prstGeom prst="rect">
@@ -6496,8 +6251,8 @@
         </p:nvSpPr>
         <p:spPr>
           <a:xfrm>
-            <a:off x="10887317" y="5443440"/>
-            <a:ext cx="5636597" cy="966290"/>
+            <a:off x="10775805" y="5276172"/>
+            <a:ext cx="5636597" cy="1466427"/>
           </a:xfrm>
           <a:prstGeom prst="rect">
             <a:avLst/>
@@ -6589,7 +6344,7 @@
                 <a:ea typeface="Open Sans Light"/>
                 <a:cs typeface="Open Sans Light"/>
               </a:rPr>
-              <a:t>identifica</a:t>
+              <a:t>cancella</a:t>
             </a:r>
             <a:r>
               <a:rPr lang="en-US" sz="2750" dirty="0">
@@ -6600,7 +6355,7 @@
                 <a:ea typeface="Open Sans Light"/>
                 <a:cs typeface="Open Sans Light"/>
               </a:rPr>
-              <a:t> la </a:t>
+              <a:t> </a:t>
             </a:r>
             <a:r>
               <a:rPr lang="en-US" sz="2750" dirty="0" err="1">
@@ -6611,7 +6366,7 @@
                 <a:ea typeface="Open Sans Light"/>
                 <a:cs typeface="Open Sans Light"/>
               </a:rPr>
-              <a:t>parola</a:t>
+              <a:t>ogni</a:t>
             </a:r>
             <a:r>
               <a:rPr lang="en-US" sz="2750" dirty="0">
@@ -6633,7 +6388,7 @@
                 <a:ea typeface="Open Sans Light"/>
                 <a:cs typeface="Open Sans Light"/>
               </a:rPr>
-              <a:t>più</a:t>
+              <a:t>occorenza</a:t>
             </a:r>
             <a:r>
               <a:rPr lang="en-US" sz="2750" dirty="0">
@@ -6655,7 +6410,7 @@
                 <a:ea typeface="Open Sans Light"/>
                 <a:cs typeface="Open Sans Light"/>
               </a:rPr>
-              <a:t>lunga</a:t>
+              <a:t>della</a:t>
             </a:r>
             <a:r>
               <a:rPr lang="en-US" sz="2750" dirty="0">
@@ -6677,7 +6432,7 @@
                 <a:ea typeface="Open Sans Light"/>
                 <a:cs typeface="Open Sans Light"/>
               </a:rPr>
-              <a:t>nel</a:t>
+              <a:t>parola</a:t>
             </a:r>
             <a:r>
               <a:rPr lang="en-US" sz="2750" dirty="0">
@@ -6688,7 +6443,18 @@
                 <a:ea typeface="Open Sans Light"/>
                 <a:cs typeface="Open Sans Light"/>
               </a:rPr>
-              <a:t> file</a:t>
+              <a:t> </a:t>
+            </a:r>
+            <a:r>
+              <a:rPr lang="en-US" sz="2750" dirty="0" err="1">
+                <a:solidFill>
+                  <a:srgbClr val="FFFFFF"/>
+                </a:solidFill>
+                <a:latin typeface="Open Sans Light"/>
+                <a:ea typeface="Open Sans Light"/>
+                <a:cs typeface="Open Sans Light"/>
+              </a:rPr>
+              <a:t>richiesta</a:t>
             </a:r>
           </a:p>
         </p:txBody>
@@ -6708,9 +6474,9 @@
         <p:grpSpPr>
           <a:xfrm>
             <a:off x="9130748" y="7147412"/>
-            <a:ext cx="1284201" cy="1289957"/>
+            <a:ext cx="1284201" cy="1526261"/>
             <a:chOff x="3837" y="0"/>
-            <a:chExt cx="1712268" cy="1719943"/>
+            <a:chExt cx="1712268" cy="2035015"/>
           </a:xfrm>
         </p:grpSpPr>
         <p:grpSp>
@@ -6809,7 +6575,7 @@
           <p:spPr>
             <a:xfrm>
               <a:off x="696856" y="450820"/>
-              <a:ext cx="326231" cy="751628"/>
+              <a:ext cx="326231" cy="1584195"/>
             </a:xfrm>
             <a:prstGeom prst="rect">
               <a:avLst/>
@@ -6827,14 +6593,31 @@
                 </a:lnSpc>
               </a:pPr>
               <a:r>
-                <a:rPr lang="en-US" sz="3399" dirty="0">
+                <a:rPr lang="en-US" sz="3350" dirty="0">
                   <a:solidFill>
                     <a:srgbClr val="FFFFFF"/>
                   </a:solidFill>
                   <a:latin typeface="Open Sans Light Bold"/>
+                  <a:ea typeface="Open Sans Light Bold"/>
+                  <a:cs typeface="Open Sans Light Bold"/>
                 </a:rPr>
-                <a:t>2</a:t>
+                <a:t>3</a:t>
               </a:r>
+            </a:p>
+            <a:p>
+              <a:pPr algn="ctr">
+                <a:lnSpc>
+                  <a:spcPts val="4759"/>
+                </a:lnSpc>
+              </a:pPr>
+              <a:endParaRPr lang="en-US" sz="3350" dirty="0">
+                <a:solidFill>
+                  <a:srgbClr val="FFFFFF"/>
+                </a:solidFill>
+                <a:latin typeface="Open Sans Light Bold"/>
+                <a:ea typeface="Open Sans Light Bold"/>
+                <a:cs typeface="Open Sans Light Bold"/>
+              </a:endParaRPr>
             </a:p>
           </p:txBody>
         </p:sp>
@@ -6853,8 +6636,8 @@
         </p:nvSpPr>
         <p:spPr>
           <a:xfrm>
-            <a:off x="10608945" y="7150003"/>
-            <a:ext cx="5407997" cy="1466427"/>
+            <a:off x="10636823" y="7331210"/>
+            <a:ext cx="5407997" cy="966290"/>
           </a:xfrm>
           <a:prstGeom prst="rect">
             <a:avLst/>
@@ -6924,7 +6707,7 @@
                 <a:ea typeface="Open Sans Light"/>
                 <a:cs typeface="Open Sans Light"/>
               </a:rPr>
-              <a:t>lettere</a:t>
+              <a:t>occorrenze</a:t>
             </a:r>
             <a:r>
               <a:rPr lang="en-US" sz="2750" dirty="0">
@@ -6935,116 +6718,7 @@
                 <a:ea typeface="Open Sans Light"/>
                 <a:cs typeface="Open Sans Light"/>
               </a:rPr>
-              <a:t> </a:t>
-            </a:r>
-            <a:r>
-              <a:rPr lang="en-US" sz="2750" dirty="0" err="1">
-                <a:solidFill>
-                  <a:srgbClr val="FFFFFF"/>
-                </a:solidFill>
-                <a:latin typeface="Open Sans Light"/>
-                <a:ea typeface="Open Sans Light"/>
-                <a:cs typeface="Open Sans Light"/>
-              </a:rPr>
-              <a:t>che</a:t>
-            </a:r>
-            <a:r>
-              <a:rPr lang="en-US" sz="2750" dirty="0">
-                <a:solidFill>
-                  <a:srgbClr val="FFFFFF"/>
-                </a:solidFill>
-                <a:latin typeface="Open Sans Light"/>
-                <a:ea typeface="Open Sans Light"/>
-                <a:cs typeface="Open Sans Light"/>
-              </a:rPr>
-              <a:t> </a:t>
-            </a:r>
-            <a:r>
-              <a:rPr lang="en-US" sz="2750" dirty="0" err="1">
-                <a:solidFill>
-                  <a:srgbClr val="FFFFFF"/>
-                </a:solidFill>
-                <a:latin typeface="Open Sans Light"/>
-                <a:ea typeface="Open Sans Light"/>
-                <a:cs typeface="Open Sans Light"/>
-              </a:rPr>
-              <a:t>formano</a:t>
-            </a:r>
-            <a:r>
-              <a:rPr lang="en-US" sz="2750" dirty="0">
-                <a:solidFill>
-                  <a:srgbClr val="FFFFFF"/>
-                </a:solidFill>
-                <a:latin typeface="Open Sans Light"/>
-                <a:ea typeface="Open Sans Light"/>
-                <a:cs typeface="Open Sans Light"/>
-              </a:rPr>
-              <a:t> la </a:t>
-            </a:r>
-            <a:r>
-              <a:rPr lang="en-US" sz="2750" dirty="0" err="1">
-                <a:solidFill>
-                  <a:srgbClr val="FFFFFF"/>
-                </a:solidFill>
-                <a:latin typeface="Open Sans Light"/>
-                <a:ea typeface="Open Sans Light"/>
-                <a:cs typeface="Open Sans Light"/>
-              </a:rPr>
-              <a:t>parola</a:t>
-            </a:r>
-            <a:r>
-              <a:rPr lang="en-US" sz="2750" dirty="0">
-                <a:solidFill>
-                  <a:srgbClr val="FFFFFF"/>
-                </a:solidFill>
-                <a:latin typeface="Open Sans Light"/>
-                <a:ea typeface="Open Sans Light"/>
-                <a:cs typeface="Open Sans Light"/>
-              </a:rPr>
-              <a:t> </a:t>
-            </a:r>
-            <a:br>
-              <a:rPr lang="en-US" sz="2750" dirty="0">
-                <a:solidFill>
-                  <a:srgbClr val="FFFFFF"/>
-                </a:solidFill>
-                <a:latin typeface="Open Sans Light"/>
-                <a:ea typeface="Open Sans Light"/>
-                <a:cs typeface="Open Sans Light"/>
-              </a:rPr>
-            </a:br>
-            <a:r>
-              <a:rPr lang="en-US" sz="2750" dirty="0">
-                <a:solidFill>
-                  <a:srgbClr val="FFFFFF"/>
-                </a:solidFill>
-                <a:latin typeface="Open Sans Light"/>
-                <a:ea typeface="Open Sans Light"/>
-                <a:cs typeface="Open Sans Light"/>
-              </a:rPr>
-              <a:t>(-1 se il file non </a:t>
-            </a:r>
-            <a:r>
-              <a:rPr lang="en-US" sz="2750" dirty="0" err="1">
-                <a:solidFill>
-                  <a:srgbClr val="FFFFFF"/>
-                </a:solidFill>
-                <a:latin typeface="Open Sans Light"/>
-                <a:ea typeface="Open Sans Light"/>
-                <a:cs typeface="Open Sans Light"/>
-              </a:rPr>
-              <a:t>esiste</a:t>
-            </a:r>
-            <a:r>
-              <a:rPr lang="en-US" sz="2750" dirty="0">
-                <a:solidFill>
-                  <a:srgbClr val="FFFFFF"/>
-                </a:solidFill>
-                <a:latin typeface="Open Sans Light"/>
-                <a:ea typeface="Open Sans Light"/>
-                <a:cs typeface="Open Sans Light"/>
-              </a:rPr>
-              <a:t>)</a:t>
+              <a:t> eliminate</a:t>
             </a:r>
           </a:p>
         </p:txBody>
@@ -7705,7 +7379,7 @@
         <p:spPr>
           <a:xfrm>
             <a:off x="1915132" y="5729839"/>
-            <a:ext cx="5044102" cy="966290"/>
+            <a:ext cx="5044102" cy="466153"/>
           </a:xfrm>
           <a:prstGeom prst="rect">
             <a:avLst/>
@@ -7767,7 +7441,7 @@
                 <a:ea typeface="Open Sans Light"/>
                 <a:cs typeface="Open Sans Light"/>
               </a:rPr>
-              <a:t> del file e il </a:t>
+              <a:t> del </a:t>
             </a:r>
             <a:r>
               <a:rPr lang="en-US" sz="2750" dirty="0" err="1">
@@ -7778,60 +7452,8 @@
                 <a:ea typeface="Open Sans Light"/>
                 <a:cs typeface="Open Sans Light"/>
               </a:rPr>
-              <a:t>numero</a:t>
-            </a:r>
-            <a:r>
-              <a:rPr lang="en-US" sz="2750" dirty="0">
-                <a:solidFill>
-                  <a:srgbClr val="000000"/>
-                </a:solidFill>
-                <a:latin typeface="Open Sans Light"/>
-                <a:ea typeface="Open Sans Light"/>
-                <a:cs typeface="Open Sans Light"/>
-              </a:rPr>
-              <a:t> di </a:t>
-            </a:r>
-            <a:r>
-              <a:rPr lang="en-US" sz="2750" dirty="0" err="1">
-                <a:solidFill>
-                  <a:srgbClr val="000000"/>
-                </a:solidFill>
-                <a:latin typeface="Open Sans Light"/>
-                <a:ea typeface="Open Sans Light"/>
-                <a:cs typeface="Open Sans Light"/>
-              </a:rPr>
-              <a:t>linea</a:t>
-            </a:r>
-            <a:r>
-              <a:rPr lang="en-US" sz="2750" dirty="0">
-                <a:solidFill>
-                  <a:srgbClr val="000000"/>
-                </a:solidFill>
-                <a:latin typeface="Open Sans Light"/>
-                <a:ea typeface="Open Sans Light"/>
-                <a:cs typeface="Open Sans Light"/>
-              </a:rPr>
-              <a:t> da </a:t>
-            </a:r>
-            <a:r>
-              <a:rPr lang="en-US" sz="2750" dirty="0" err="1">
-                <a:solidFill>
-                  <a:srgbClr val="000000"/>
-                </a:solidFill>
-                <a:latin typeface="Open Sans Light"/>
-                <a:ea typeface="Open Sans Light"/>
-                <a:cs typeface="Open Sans Light"/>
-              </a:rPr>
-              <a:t>eliminare</a:t>
-            </a:r>
-            <a:endParaRPr lang="en-US" sz="2750" dirty="0">
-              <a:solidFill>
-                <a:srgbClr val="000000"/>
-              </a:solidFill>
-              <a:latin typeface="Open Sans Light"/>
-              <a:ea typeface="Open Sans Light"/>
-              <a:cs typeface="Open Sans Light"/>
-            </a:endParaRPr>
+              <a:t>direttorio</a:t>
+            </a:r>
           </a:p>
         </p:txBody>
       </p:sp>
@@ -7965,7 +7587,7 @@
         </p:nvSpPr>
         <p:spPr>
           <a:xfrm>
-            <a:off x="1915132" y="7834598"/>
+            <a:off x="1915132" y="7681269"/>
             <a:ext cx="5189366" cy="1466427"/>
           </a:xfrm>
           <a:prstGeom prst="rect">
@@ -8050,7 +7672,7 @@
                 <a:ea typeface="Open Sans Light"/>
                 <a:cs typeface="Open Sans Light"/>
               </a:rPr>
-              <a:t> il nuovo </a:t>
+              <a:t> la </a:t>
             </a:r>
             <a:r>
               <a:rPr lang="en-US" sz="2750" dirty="0" err="1">
@@ -8061,7 +7683,7 @@
                 <a:ea typeface="Open Sans Light"/>
                 <a:cs typeface="Open Sans Light"/>
               </a:rPr>
-              <a:t>contenuto</a:t>
+              <a:t>lista</a:t>
             </a:r>
             <a:r>
               <a:rPr lang="en-US" sz="2750" dirty="0">
@@ -8072,7 +7694,106 @@
                 <a:ea typeface="Open Sans Light"/>
                 <a:cs typeface="Open Sans Light"/>
               </a:rPr>
-              <a:t> del file</a:t>
+              <a:t> di </a:t>
+            </a:r>
+            <a:r>
+              <a:rPr lang="en-US" sz="2750" dirty="0" err="1">
+                <a:solidFill>
+                  <a:srgbClr val="000000"/>
+                </a:solidFill>
+                <a:latin typeface="Open Sans Light"/>
+                <a:ea typeface="Open Sans Light"/>
+                <a:cs typeface="Open Sans Light"/>
+              </a:rPr>
+              <a:t>nomi</a:t>
+            </a:r>
+            <a:r>
+              <a:rPr lang="en-US" sz="2750" dirty="0">
+                <a:solidFill>
+                  <a:srgbClr val="000000"/>
+                </a:solidFill>
+                <a:latin typeface="Open Sans Light"/>
+                <a:ea typeface="Open Sans Light"/>
+                <a:cs typeface="Open Sans Light"/>
+              </a:rPr>
+              <a:t> </a:t>
+            </a:r>
+            <a:r>
+              <a:rPr lang="en-US" sz="2750" dirty="0" err="1">
+                <a:solidFill>
+                  <a:srgbClr val="000000"/>
+                </a:solidFill>
+                <a:latin typeface="Open Sans Light"/>
+                <a:ea typeface="Open Sans Light"/>
+                <a:cs typeface="Open Sans Light"/>
+              </a:rPr>
+              <a:t>dei</a:t>
+            </a:r>
+            <a:r>
+              <a:rPr lang="en-US" sz="2750" dirty="0">
+                <a:solidFill>
+                  <a:srgbClr val="000000"/>
+                </a:solidFill>
+                <a:latin typeface="Open Sans Light"/>
+                <a:ea typeface="Open Sans Light"/>
+                <a:cs typeface="Open Sans Light"/>
+              </a:rPr>
+              <a:t> file </a:t>
+            </a:r>
+            <a:r>
+              <a:rPr lang="en-US" sz="2750" dirty="0" err="1">
+                <a:solidFill>
+                  <a:srgbClr val="000000"/>
+                </a:solidFill>
+                <a:latin typeface="Open Sans Light"/>
+                <a:ea typeface="Open Sans Light"/>
+                <a:cs typeface="Open Sans Light"/>
+              </a:rPr>
+              <a:t>contenuti</a:t>
+            </a:r>
+            <a:r>
+              <a:rPr lang="en-US" sz="2750" dirty="0">
+                <a:solidFill>
+                  <a:srgbClr val="000000"/>
+                </a:solidFill>
+                <a:latin typeface="Open Sans Light"/>
+                <a:ea typeface="Open Sans Light"/>
+                <a:cs typeface="Open Sans Light"/>
+              </a:rPr>
+              <a:t> </a:t>
+            </a:r>
+            <a:r>
+              <a:rPr lang="en-US" sz="2750" dirty="0" err="1">
+                <a:solidFill>
+                  <a:srgbClr val="000000"/>
+                </a:solidFill>
+                <a:latin typeface="Open Sans Light"/>
+                <a:ea typeface="Open Sans Light"/>
+                <a:cs typeface="Open Sans Light"/>
+              </a:rPr>
+              <a:t>nei</a:t>
+            </a:r>
+            <a:r>
+              <a:rPr lang="en-US" sz="2750" dirty="0">
+                <a:solidFill>
+                  <a:srgbClr val="000000"/>
+                </a:solidFill>
+                <a:latin typeface="Open Sans Light"/>
+                <a:ea typeface="Open Sans Light"/>
+                <a:cs typeface="Open Sans Light"/>
+              </a:rPr>
+              <a:t> sotto-</a:t>
+            </a:r>
+            <a:r>
+              <a:rPr lang="en-US" sz="2750" dirty="0" err="1">
+                <a:solidFill>
+                  <a:srgbClr val="000000"/>
+                </a:solidFill>
+                <a:latin typeface="Open Sans Light"/>
+                <a:ea typeface="Open Sans Light"/>
+                <a:cs typeface="Open Sans Light"/>
+              </a:rPr>
+              <a:t>direttori</a:t>
             </a:r>
           </a:p>
         </p:txBody>
@@ -8429,7 +8150,7 @@
                 <a:ea typeface="Open Sans Light"/>
                 <a:cs typeface="Open Sans Light"/>
               </a:rPr>
-              <a:t>Crea</a:t>
+              <a:t>Gestione</a:t>
             </a:r>
             <a:r>
               <a:rPr lang="en-US" sz="2750" dirty="0">
@@ -8440,7 +8161,7 @@
                 <a:ea typeface="Open Sans Light"/>
                 <a:cs typeface="Open Sans Light"/>
               </a:rPr>
-              <a:t> un </a:t>
+              <a:t> </a:t>
             </a:r>
             <a:r>
               <a:rPr lang="en-US" sz="2750" dirty="0" err="1">
@@ -8451,7 +8172,7 @@
                 <a:ea typeface="Open Sans Light"/>
                 <a:cs typeface="Open Sans Light"/>
               </a:rPr>
-              <a:t>figlio</a:t>
+              <a:t>concorrente</a:t>
             </a:r>
             <a:r>
               <a:rPr lang="en-US" sz="2750" dirty="0">
@@ -8462,7 +8183,7 @@
                 <a:ea typeface="Open Sans Light"/>
                 <a:cs typeface="Open Sans Light"/>
               </a:rPr>
-              <a:t> per </a:t>
+              <a:t> </a:t>
             </a:r>
             <a:r>
               <a:rPr lang="en-US" sz="2750" dirty="0" err="1">
@@ -8473,7 +8194,7 @@
                 <a:ea typeface="Open Sans Light"/>
                 <a:cs typeface="Open Sans Light"/>
               </a:rPr>
-              <a:t>gestire</a:t>
+              <a:t>delle</a:t>
             </a:r>
             <a:r>
               <a:rPr lang="en-US" sz="2750" dirty="0">
@@ -8484,7 +8205,7 @@
                 <a:ea typeface="Open Sans Light"/>
                 <a:cs typeface="Open Sans Light"/>
               </a:rPr>
-              <a:t> le </a:t>
+              <a:t> </a:t>
             </a:r>
             <a:r>
               <a:rPr lang="en-US" sz="2750" dirty="0" err="1">
@@ -8496,39 +8217,6 @@
                 <a:cs typeface="Open Sans Light"/>
               </a:rPr>
               <a:t>richieste</a:t>
-            </a:r>
-            <a:r>
-              <a:rPr lang="en-US" sz="2750" dirty="0">
-                <a:solidFill>
-                  <a:srgbClr val="FFFFFF"/>
-                </a:solidFill>
-                <a:latin typeface="Open Sans Light"/>
-                <a:ea typeface="Open Sans Light"/>
-                <a:cs typeface="Open Sans Light"/>
-              </a:rPr>
-              <a:t> in arrive </a:t>
-            </a:r>
-            <a:r>
-              <a:rPr lang="en-US" sz="2750" dirty="0" err="1">
-                <a:solidFill>
-                  <a:srgbClr val="FFFFFF"/>
-                </a:solidFill>
-                <a:latin typeface="Open Sans Light"/>
-                <a:ea typeface="Open Sans Light"/>
-                <a:cs typeface="Open Sans Light"/>
-              </a:rPr>
-              <a:t>dai</a:t>
-            </a:r>
-            <a:r>
-              <a:rPr lang="en-US" sz="2750" dirty="0">
-                <a:solidFill>
-                  <a:srgbClr val="FFFFFF"/>
-                </a:solidFill>
-                <a:latin typeface="Open Sans Light"/>
-                <a:ea typeface="Open Sans Light"/>
-                <a:cs typeface="Open Sans Light"/>
-              </a:rPr>
-              <a:t> client</a:t>
             </a:r>
           </a:p>
         </p:txBody>
@@ -8649,7 +8337,7 @@
           <p:spPr>
             <a:xfrm>
               <a:off x="696856" y="450820"/>
-              <a:ext cx="326231" cy="751628"/>
+              <a:ext cx="326231" cy="763457"/>
             </a:xfrm>
             <a:prstGeom prst="rect">
               <a:avLst/>
@@ -8667,13 +8355,15 @@
                 </a:lnSpc>
               </a:pPr>
               <a:r>
-                <a:rPr lang="en-US" sz="3399" dirty="0">
+                <a:rPr lang="en-US" sz="3350" dirty="0">
                   <a:solidFill>
                     <a:srgbClr val="FFFFFF"/>
                   </a:solidFill>
                   <a:latin typeface="Open Sans Light Bold"/>
+                  <a:ea typeface="Open Sans Light Bold"/>
+                  <a:cs typeface="Open Sans Light Bold"/>
                 </a:rPr>
-                <a:t>2</a:t>
+                <a:t>3</a:t>
               </a:r>
             </a:p>
           </p:txBody>
@@ -8720,7 +8410,7 @@
                 <a:ea typeface="Open Sans Light"/>
                 <a:cs typeface="Open Sans Light"/>
               </a:rPr>
-              <a:t>Elimina</a:t>
+              <a:t>Restituisce</a:t>
             </a:r>
             <a:r>
               <a:rPr lang="en-US" sz="2750" dirty="0">
@@ -8742,7 +8432,7 @@
                 <a:ea typeface="Open Sans Light"/>
                 <a:cs typeface="Open Sans Light"/>
               </a:rPr>
-              <a:t>riga</a:t>
+              <a:t>lista</a:t>
             </a:r>
             <a:r>
               <a:rPr lang="en-US" sz="2750" dirty="0">
@@ -8753,7 +8443,7 @@
                 <a:ea typeface="Open Sans Light"/>
                 <a:cs typeface="Open Sans Light"/>
               </a:rPr>
-              <a:t> dal file </a:t>
+              <a:t> di </a:t>
             </a:r>
             <a:r>
               <a:rPr lang="en-US" sz="2750" dirty="0" err="1">
@@ -8764,7 +8454,7 @@
                 <a:ea typeface="Open Sans Light"/>
                 <a:cs typeface="Open Sans Light"/>
               </a:rPr>
-              <a:t>ricevuto</a:t>
+              <a:t>nomi</a:t>
             </a:r>
             <a:r>
               <a:rPr lang="en-US" sz="2750" dirty="0">
@@ -8775,7 +8465,7 @@
                 <a:ea typeface="Open Sans Light"/>
                 <a:cs typeface="Open Sans Light"/>
               </a:rPr>
-              <a:t> e </a:t>
+              <a:t> </a:t>
             </a:r>
             <a:r>
               <a:rPr lang="en-US" sz="2750" dirty="0" err="1">
@@ -8786,7 +8476,7 @@
                 <a:ea typeface="Open Sans Light"/>
                 <a:cs typeface="Open Sans Light"/>
               </a:rPr>
-              <a:t>invia</a:t>
+              <a:t>dei</a:t>
             </a:r>
             <a:r>
               <a:rPr lang="en-US" sz="2750" dirty="0">
@@ -8797,7 +8487,7 @@
                 <a:ea typeface="Open Sans Light"/>
                 <a:cs typeface="Open Sans Light"/>
               </a:rPr>
-              <a:t> il nuovo </a:t>
+              <a:t> sotto-</a:t>
             </a:r>
             <a:r>
               <a:rPr lang="en-US" sz="2750" dirty="0" err="1">
@@ -8808,18 +8498,7 @@
                 <a:ea typeface="Open Sans Light"/>
                 <a:cs typeface="Open Sans Light"/>
               </a:rPr>
-              <a:t>contenuto</a:t>
-            </a:r>
-            <a:r>
-              <a:rPr lang="en-US" sz="2750" dirty="0">
-                <a:solidFill>
-                  <a:srgbClr val="FFFFFF"/>
-                </a:solidFill>
-                <a:latin typeface="Open Sans Light"/>
-                <a:ea typeface="Open Sans Light"/>
-                <a:cs typeface="Open Sans Light"/>
-              </a:rPr>
-              <a:t> al client</a:t>
+              <a:t>direttori</a:t>
             </a:r>
           </a:p>
         </p:txBody>
@@ -9117,36 +8796,6 @@
           </a:p>
         </p:txBody>
       </p:sp>
-      <p:pic>
-        <p:nvPicPr>
-          <p:cNvPr id="2" name="Picture 2" descr="Text&#10;&#10;Description automatically generated">
-            <a:extLst>
-              <a:ext uri="{FF2B5EF4-FFF2-40B4-BE49-F238E27FC236}">
-                <a16:creationId xmlns:a16="http://schemas.microsoft.com/office/drawing/2014/main" id="{DC5FC02D-83F6-4E61-A5D5-A4C070E6D068}"/>
-              </a:ext>
-            </a:extLst>
-          </p:cNvPr>
-          <p:cNvPicPr>
-            <a:picLocks noChangeAspect="1"/>
-          </p:cNvPicPr>
-          <p:nvPr/>
-        </p:nvPicPr>
-        <p:blipFill>
-          <a:blip r:embed="rId2"/>
-          <a:stretch>
-            <a:fillRect/>
-          </a:stretch>
-        </p:blipFill>
-        <p:spPr>
-          <a:xfrm>
-            <a:off x="352425" y="1531233"/>
-            <a:ext cx="14001750" cy="8500883"/>
-          </a:xfrm>
-          <a:prstGeom prst="rect">
-            <a:avLst/>
-          </a:prstGeom>
-        </p:spPr>
-      </p:pic>
     </p:spTree>
   </p:cSld>
   <p:clrMapOvr>
@@ -9521,7 +9170,7 @@
         </p:nvSpPr>
         <p:spPr>
           <a:xfrm>
-            <a:off x="13563600" y="-278394"/>
+            <a:off x="9925515" y="-125065"/>
             <a:ext cx="9178636" cy="942437"/>
           </a:xfrm>
           <a:prstGeom prst="rect">
@@ -9530,7 +9179,7 @@
           <a:noFill/>
         </p:spPr>
         <p:txBody>
-          <a:bodyPr wrap="square">
+          <a:bodyPr wrap="square" lIns="91440" tIns="45720" rIns="91440" bIns="45720" anchor="t">
             <a:spAutoFit/>
           </a:bodyPr>
           <a:lstStyle/>
@@ -9547,7 +9196,7 @@
                 </a:solidFill>
                 <a:latin typeface="Open Sans Extra Bold"/>
               </a:rPr>
-              <a:t>Senza </a:t>
+              <a:t>Select </a:t>
             </a:r>
             <a:r>
               <a:rPr lang="en-US" sz="3600" dirty="0" err="1">
@@ -9556,47 +9205,37 @@
                 </a:solidFill>
                 <a:latin typeface="Open Sans Extra Bold"/>
               </a:rPr>
+              <a:t>servizio</a:t>
+            </a:r>
+            <a:r>
+              <a:rPr lang="en-US" sz="3600" dirty="0">
+                <a:solidFill>
+                  <a:schemeClr val="bg1"/>
+                </a:solidFill>
+                <a:latin typeface="Open Sans Extra Bold"/>
+              </a:rPr>
+              <a:t> senza </a:t>
+            </a:r>
+            <a:r>
+              <a:rPr lang="en-US" sz="3600" dirty="0" err="1">
+                <a:solidFill>
+                  <a:schemeClr val="bg1"/>
+                </a:solidFill>
+                <a:latin typeface="Open Sans Extra Bold"/>
+              </a:rPr>
               <a:t>connessione</a:t>
             </a:r>
-            <a:endParaRPr lang="en-US" sz="3600" dirty="0">
+            <a:endParaRPr lang="en-US" sz="3600" dirty="0" err="1">
               <a:solidFill>
                 <a:schemeClr val="bg1"/>
               </a:solidFill>
               <a:latin typeface="Open Sans Extra Bold"/>
+              <a:ea typeface="Open Sans Extra Bold"/>
+              <a:cs typeface="Open Sans Extra Bold"/>
             </a:endParaRPr>
           </a:p>
         </p:txBody>
       </p:sp>
-      <p:pic>
-        <p:nvPicPr>
-          <p:cNvPr id="11" name="Picture 11" descr="Text&#10;&#10;Description automatically generated">
-            <a:extLst>
-              <a:ext uri="{FF2B5EF4-FFF2-40B4-BE49-F238E27FC236}">
-                <a16:creationId xmlns:a16="http://schemas.microsoft.com/office/drawing/2014/main" id="{4A25DDF1-808D-4BAB-8375-462FC16F38D2}"/>
-              </a:ext>
-            </a:extLst>
-          </p:cNvPr>
-          <p:cNvPicPr>
-            <a:picLocks noChangeAspect="1"/>
-          </p:cNvPicPr>
-          <p:nvPr/>
-        </p:nvPicPr>
-        <p:blipFill>
-          <a:blip r:embed="rId2"/>
-          <a:stretch>
-            <a:fillRect/>
-          </a:stretch>
-        </p:blipFill>
-        <p:spPr>
-          <a:xfrm>
-            <a:off x="352425" y="1659176"/>
-            <a:ext cx="12153900" cy="8149748"/>
-          </a:xfrm>
-          <a:prstGeom prst="rect">
-            <a:avLst/>
-          </a:prstGeom>
-        </p:spPr>
-      </p:pic>
     </p:spTree>
   </p:cSld>
   <p:clrMapOvr>
@@ -9880,36 +9519,6 @@
           </a:p>
         </p:txBody>
       </p:sp>
-      <p:pic>
-        <p:nvPicPr>
-          <p:cNvPr id="2" name="Picture 2" descr="Text&#10;&#10;Description automatically generated">
-            <a:extLst>
-              <a:ext uri="{FF2B5EF4-FFF2-40B4-BE49-F238E27FC236}">
-                <a16:creationId xmlns:a16="http://schemas.microsoft.com/office/drawing/2014/main" id="{2E477557-BB05-4E17-8263-8C12C4F90BDC}"/>
-              </a:ext>
-            </a:extLst>
-          </p:cNvPr>
-          <p:cNvPicPr>
-            <a:picLocks noChangeAspect="1"/>
-          </p:cNvPicPr>
-          <p:nvPr/>
-        </p:nvPicPr>
-        <p:blipFill>
-          <a:blip r:embed="rId2"/>
-          <a:stretch>
-            <a:fillRect/>
-          </a:stretch>
-        </p:blipFill>
-        <p:spPr>
-          <a:xfrm>
-            <a:off x="352425" y="1640251"/>
-            <a:ext cx="9705975" cy="8159023"/>
-          </a:xfrm>
-          <a:prstGeom prst="rect">
-            <a:avLst/>
-          </a:prstGeom>
-        </p:spPr>
-      </p:pic>
     </p:spTree>
     <p:extLst>
       <p:ext uri="{BB962C8B-B14F-4D97-AF65-F5344CB8AC3E}">
@@ -10057,7 +9666,7 @@
         </p:nvSpPr>
         <p:spPr>
           <a:xfrm>
-            <a:off x="5420741" y="669254"/>
+            <a:off x="3971083" y="669254"/>
             <a:ext cx="6951218" cy="821250"/>
           </a:xfrm>
           <a:prstGeom prst="rect">
@@ -10082,7 +9691,7 @@
                 </a:solidFill>
                 <a:latin typeface="Open Sans"/>
               </a:rPr>
-              <a:t>Server Concorrente</a:t>
+              <a:t>Server</a:t>
             </a:r>
             <a:endParaRPr lang="en-US" sz="3600" dirty="0">
               <a:solidFill>
@@ -10291,7 +9900,7 @@
         </p:nvSpPr>
         <p:spPr>
           <a:xfrm>
-            <a:off x="13868400" y="-214811"/>
+            <a:off x="10704241" y="-270567"/>
             <a:ext cx="9178636" cy="942437"/>
           </a:xfrm>
           <a:prstGeom prst="rect">
@@ -10300,7 +9909,7 @@
           <a:noFill/>
         </p:spPr>
         <p:txBody>
-          <a:bodyPr wrap="square">
+          <a:bodyPr wrap="square" lIns="91440" tIns="45720" rIns="91440" bIns="45720" anchor="t">
             <a:spAutoFit/>
           </a:bodyPr>
           <a:lstStyle/>
@@ -10317,7 +9926,25 @@
                 </a:solidFill>
                 <a:latin typeface="Open Sans Extra Bold"/>
               </a:rPr>
-              <a:t>Con </a:t>
+              <a:t>Select </a:t>
+            </a:r>
+            <a:r>
+              <a:rPr lang="en-US" sz="3600" dirty="0" err="1">
+                <a:solidFill>
+                  <a:schemeClr val="bg1"/>
+                </a:solidFill>
+                <a:latin typeface="Open Sans Extra Bold"/>
+              </a:rPr>
+              <a:t>servizo</a:t>
+            </a:r>
+            <a:r>
+              <a:rPr lang="en-US" sz="3600" dirty="0">
+                <a:solidFill>
+                  <a:schemeClr val="bg1"/>
+                </a:solidFill>
+                <a:latin typeface="Open Sans Extra Bold"/>
+              </a:rPr>
+              <a:t> con </a:t>
             </a:r>
             <a:r>
               <a:rPr lang="en-US" sz="3600" dirty="0" err="1">
@@ -10337,36 +9964,6 @@
           </a:p>
         </p:txBody>
       </p:sp>
-      <p:pic>
-        <p:nvPicPr>
-          <p:cNvPr id="12" name="Picture 12" descr="Text&#10;&#10;Description automatically generated">
-            <a:extLst>
-              <a:ext uri="{FF2B5EF4-FFF2-40B4-BE49-F238E27FC236}">
-                <a16:creationId xmlns:a16="http://schemas.microsoft.com/office/drawing/2014/main" id="{6E6C643C-A765-4385-A187-9254F12F2379}"/>
-              </a:ext>
-            </a:extLst>
-          </p:cNvPr>
-          <p:cNvPicPr>
-            <a:picLocks noChangeAspect="1"/>
-          </p:cNvPicPr>
-          <p:nvPr/>
-        </p:nvPicPr>
-        <p:blipFill>
-          <a:blip r:embed="rId2"/>
-          <a:stretch>
-            <a:fillRect/>
-          </a:stretch>
-        </p:blipFill>
-        <p:spPr>
-          <a:xfrm>
-            <a:off x="352425" y="1639149"/>
-            <a:ext cx="14220825" cy="7980252"/>
-          </a:xfrm>
-          <a:prstGeom prst="rect">
-            <a:avLst/>
-          </a:prstGeom>
-        </p:spPr>
-      </p:pic>
     </p:spTree>
     <p:extLst>
       <p:ext uri="{BB962C8B-B14F-4D97-AF65-F5344CB8AC3E}">

</xml_diff>